<commit_message>
wip on overview of designer
</commit_message>
<xml_diff>
--- a/docs/CRC-Study-Designer-Overview.pptx
+++ b/docs/CRC-Study-Designer-Overview.pptx
@@ -6,6 +6,15 @@
   </p:sldMasterIdLst>
   <p:sldIdLst>
     <p:sldId id="256" r:id="rId2"/>
+    <p:sldId id="260" r:id="rId3"/>
+    <p:sldId id="261" r:id="rId4"/>
+    <p:sldId id="263" r:id="rId5"/>
+    <p:sldId id="264" r:id="rId6"/>
+    <p:sldId id="265" r:id="rId7"/>
+    <p:sldId id="266" r:id="rId8"/>
+    <p:sldId id="257" r:id="rId9"/>
+    <p:sldId id="258" r:id="rId10"/>
+    <p:sldId id="259" r:id="rId11"/>
   </p:sldIdLst>
   <p:sldSz cx="12192000" cy="6858000"/>
   <p:notesSz cx="6858000" cy="9144000"/>
@@ -104,6 +113,11 @@
       </a:defRPr>
     </a:lvl9pPr>
   </p:defaultTextStyle>
+  <p:extLst>
+    <p:ext uri="{EFAFB233-063F-42B5-8137-9DF3F51BA10A}">
+      <p15:sldGuideLst xmlns:p15="http://schemas.microsoft.com/office/powerpoint/2012/main"/>
+    </p:ext>
+  </p:extLst>
 </p:presentation>
 </file>
 
@@ -3321,12 +3335,153 @@
           <a:chExt cx="0" cy="0"/>
         </a:xfrm>
       </p:grpSpPr>
+      <p:grpSp>
+        <p:nvGrpSpPr>
+          <p:cNvPr id="12" name="Group 11">
+            <a:extLst>
+              <a:ext uri="{FF2B5EF4-FFF2-40B4-BE49-F238E27FC236}">
+                <a16:creationId xmlns:a16="http://schemas.microsoft.com/office/drawing/2014/main" id="{640F3198-D1F7-41A1-E2E0-691E204762FE}"/>
+              </a:ext>
+            </a:extLst>
+          </p:cNvPr>
+          <p:cNvGrpSpPr/>
+          <p:nvPr/>
+        </p:nvGrpSpPr>
+        <p:grpSpPr>
+          <a:xfrm>
+            <a:off x="345558" y="454808"/>
+            <a:ext cx="11547374" cy="4632871"/>
+            <a:chOff x="345558" y="454808"/>
+            <a:chExt cx="11547374" cy="4632871"/>
+          </a:xfrm>
+        </p:grpSpPr>
+        <p:pic>
+          <p:nvPicPr>
+            <p:cNvPr id="5" name="Picture 4" descr="A screenshot of a computer&#10;&#10;Description automatically generated">
+              <a:extLst>
+                <a:ext uri="{FF2B5EF4-FFF2-40B4-BE49-F238E27FC236}">
+                  <a16:creationId xmlns:a16="http://schemas.microsoft.com/office/drawing/2014/main" id="{256D9EF8-6BD3-1D96-19B9-C2CED87EE11C}"/>
+                </a:ext>
+              </a:extLst>
+            </p:cNvPr>
+            <p:cNvPicPr>
+              <a:picLocks noChangeAspect="1"/>
+            </p:cNvPicPr>
+            <p:nvPr/>
+          </p:nvPicPr>
+          <p:blipFill>
+            <a:blip r:embed="rId2"/>
+            <a:stretch>
+              <a:fillRect/>
+            </a:stretch>
+          </p:blipFill>
+          <p:spPr>
+            <a:xfrm>
+              <a:off x="345558" y="454808"/>
+              <a:ext cx="11547374" cy="4632871"/>
+            </a:xfrm>
+            <a:prstGeom prst="rect">
+              <a:avLst/>
+            </a:prstGeom>
+          </p:spPr>
+        </p:pic>
+        <p:pic>
+          <p:nvPicPr>
+            <p:cNvPr id="9" name="Picture 8" descr="A screenshot of a computer&#10;&#10;Description automatically generated">
+              <a:extLst>
+                <a:ext uri="{FF2B5EF4-FFF2-40B4-BE49-F238E27FC236}">
+                  <a16:creationId xmlns:a16="http://schemas.microsoft.com/office/drawing/2014/main" id="{AC2E0174-737C-BDDC-9F23-7CEFEB244D4D}"/>
+                </a:ext>
+              </a:extLst>
+            </p:cNvPr>
+            <p:cNvPicPr>
+              <a:picLocks noChangeAspect="1"/>
+            </p:cNvPicPr>
+            <p:nvPr/>
+          </p:nvPicPr>
+          <p:blipFill>
+            <a:blip r:embed="rId3"/>
+            <a:stretch>
+              <a:fillRect/>
+            </a:stretch>
+          </p:blipFill>
+          <p:spPr>
+            <a:xfrm>
+              <a:off x="2775097" y="1882710"/>
+              <a:ext cx="6172201" cy="3185821"/>
+            </a:xfrm>
+            <a:prstGeom prst="rect">
+              <a:avLst/>
+            </a:prstGeom>
+          </p:spPr>
+        </p:pic>
+        <p:pic>
+          <p:nvPicPr>
+            <p:cNvPr id="11" name="Picture 10">
+              <a:extLst>
+                <a:ext uri="{FF2B5EF4-FFF2-40B4-BE49-F238E27FC236}">
+                  <a16:creationId xmlns:a16="http://schemas.microsoft.com/office/drawing/2014/main" id="{57C22F63-0F9D-A0F2-2CCA-3EB4C04E32A8}"/>
+                </a:ext>
+              </a:extLst>
+            </p:cNvPr>
+            <p:cNvPicPr>
+              <a:picLocks noChangeAspect="1"/>
+            </p:cNvPicPr>
+            <p:nvPr/>
+          </p:nvPicPr>
+          <p:blipFill>
+            <a:blip r:embed="rId4"/>
+            <a:stretch>
+              <a:fillRect/>
+            </a:stretch>
+          </p:blipFill>
+          <p:spPr>
+            <a:xfrm>
+              <a:off x="2780413" y="1877395"/>
+              <a:ext cx="1190847" cy="245030"/>
+            </a:xfrm>
+            <a:prstGeom prst="rect">
+              <a:avLst/>
+            </a:prstGeom>
+          </p:spPr>
+        </p:pic>
+      </p:grpSp>
+    </p:spTree>
+    <p:extLst>
+      <p:ext uri="{BB962C8B-B14F-4D97-AF65-F5344CB8AC3E}">
+        <p14:creationId xmlns:p14="http://schemas.microsoft.com/office/powerpoint/2010/main" val="574281351"/>
+      </p:ext>
+    </p:extLst>
+  </p:cSld>
+  <p:clrMapOvr>
+    <a:masterClrMapping/>
+  </p:clrMapOvr>
+</p:sld>
+</file>
+
+<file path=ppt/slides/slide10.xml><?xml version="1.0" encoding="utf-8"?>
+<p:sld xmlns:a="http://schemas.openxmlformats.org/drawingml/2006/main" xmlns:r="http://schemas.openxmlformats.org/officeDocument/2006/relationships" xmlns:p="http://schemas.openxmlformats.org/presentationml/2006/main">
+  <p:cSld>
+    <p:spTree>
+      <p:nvGrpSpPr>
+        <p:cNvPr id="1" name=""/>
+        <p:cNvGrpSpPr/>
+        <p:nvPr/>
+      </p:nvGrpSpPr>
+      <p:grpSpPr>
+        <a:xfrm>
+          <a:off x="0" y="0"/>
+          <a:ext cx="0" cy="0"/>
+          <a:chOff x="0" y="0"/>
+          <a:chExt cx="0" cy="0"/>
+        </a:xfrm>
+      </p:grpSpPr>
       <p:pic>
         <p:nvPicPr>
-          <p:cNvPr id="5" name="Picture 4" descr="A screenshot of a computer&#10;&#10;Description automatically generated">
-            <a:extLst>
-              <a:ext uri="{FF2B5EF4-FFF2-40B4-BE49-F238E27FC236}">
-                <a16:creationId xmlns:a16="http://schemas.microsoft.com/office/drawing/2014/main" id="{256D9EF8-6BD3-1D96-19B9-C2CED87EE11C}"/>
+          <p:cNvPr id="4" name="Picture 3">
+            <a:extLst>
+              <a:ext uri="{FF2B5EF4-FFF2-40B4-BE49-F238E27FC236}">
+                <a16:creationId xmlns:a16="http://schemas.microsoft.com/office/drawing/2014/main" id="{49453AF6-E7B6-283B-43F8-CB0BBAA60104}"/>
               </a:ext>
             </a:extLst>
           </p:cNvPr>
@@ -3343,38 +3498,8 @@
         </p:blipFill>
         <p:spPr>
           <a:xfrm>
-            <a:off x="345558" y="454808"/>
-            <a:ext cx="11547374" cy="4632871"/>
-          </a:xfrm>
-          <a:prstGeom prst="rect">
-            <a:avLst/>
-          </a:prstGeom>
-        </p:spPr>
-      </p:pic>
-      <p:pic>
-        <p:nvPicPr>
-          <p:cNvPr id="9" name="Picture 8" descr="A screenshot of a computer&#10;&#10;Description automatically generated">
-            <a:extLst>
-              <a:ext uri="{FF2B5EF4-FFF2-40B4-BE49-F238E27FC236}">
-                <a16:creationId xmlns:a16="http://schemas.microsoft.com/office/drawing/2014/main" id="{AC2E0174-737C-BDDC-9F23-7CEFEB244D4D}"/>
-              </a:ext>
-            </a:extLst>
-          </p:cNvPr>
-          <p:cNvPicPr>
-            <a:picLocks noChangeAspect="1"/>
-          </p:cNvPicPr>
-          <p:nvPr/>
-        </p:nvPicPr>
-        <p:blipFill>
-          <a:blip r:embed="rId3"/>
-          <a:stretch>
-            <a:fillRect/>
-          </a:stretch>
-        </p:blipFill>
-        <p:spPr>
-          <a:xfrm>
-            <a:off x="2775097" y="1882710"/>
-            <a:ext cx="6172201" cy="3185821"/>
+            <a:off x="2209800" y="1975170"/>
+            <a:ext cx="7772400" cy="2907660"/>
           </a:xfrm>
           <a:prstGeom prst="rect">
             <a:avLst/>
@@ -3384,7 +3509,504 @@
     </p:spTree>
     <p:extLst>
       <p:ext uri="{BB962C8B-B14F-4D97-AF65-F5344CB8AC3E}">
-        <p14:creationId xmlns:p14="http://schemas.microsoft.com/office/powerpoint/2010/main" val="574281351"/>
+        <p14:creationId xmlns:p14="http://schemas.microsoft.com/office/powerpoint/2010/main" val="4105178058"/>
+      </p:ext>
+    </p:extLst>
+  </p:cSld>
+  <p:clrMapOvr>
+    <a:masterClrMapping/>
+  </p:clrMapOvr>
+</p:sld>
+</file>
+
+<file path=ppt/slides/slide2.xml><?xml version="1.0" encoding="utf-8"?>
+<p:sld xmlns:a="http://schemas.openxmlformats.org/drawingml/2006/main" xmlns:r="http://schemas.openxmlformats.org/officeDocument/2006/relationships" xmlns:p="http://schemas.openxmlformats.org/presentationml/2006/main">
+  <p:cSld>
+    <p:spTree>
+      <p:nvGrpSpPr>
+        <p:cNvPr id="1" name=""/>
+        <p:cNvGrpSpPr/>
+        <p:nvPr/>
+      </p:nvGrpSpPr>
+      <p:grpSpPr>
+        <a:xfrm>
+          <a:off x="0" y="0"/>
+          <a:ext cx="0" cy="0"/>
+          <a:chOff x="0" y="0"/>
+          <a:chExt cx="0" cy="0"/>
+        </a:xfrm>
+      </p:grpSpPr>
+      <p:pic>
+        <p:nvPicPr>
+          <p:cNvPr id="4" name="Picture 3">
+            <a:extLst>
+              <a:ext uri="{FF2B5EF4-FFF2-40B4-BE49-F238E27FC236}">
+                <a16:creationId xmlns:a16="http://schemas.microsoft.com/office/drawing/2014/main" id="{EEBF25CE-64F9-D5E5-6B96-772D6CA6786A}"/>
+              </a:ext>
+            </a:extLst>
+          </p:cNvPr>
+          <p:cNvPicPr>
+            <a:picLocks noChangeAspect="1"/>
+          </p:cNvPicPr>
+          <p:nvPr/>
+        </p:nvPicPr>
+        <p:blipFill>
+          <a:blip r:embed="rId2"/>
+          <a:stretch>
+            <a:fillRect/>
+          </a:stretch>
+        </p:blipFill>
+        <p:spPr>
+          <a:xfrm>
+            <a:off x="2209800" y="1456750"/>
+            <a:ext cx="7772400" cy="3944500"/>
+          </a:xfrm>
+          <a:prstGeom prst="rect">
+            <a:avLst/>
+          </a:prstGeom>
+        </p:spPr>
+      </p:pic>
+    </p:spTree>
+    <p:extLst>
+      <p:ext uri="{BB962C8B-B14F-4D97-AF65-F5344CB8AC3E}">
+        <p14:creationId xmlns:p14="http://schemas.microsoft.com/office/powerpoint/2010/main" val="3428008261"/>
+      </p:ext>
+    </p:extLst>
+  </p:cSld>
+  <p:clrMapOvr>
+    <a:masterClrMapping/>
+  </p:clrMapOvr>
+</p:sld>
+</file>
+
+<file path=ppt/slides/slide3.xml><?xml version="1.0" encoding="utf-8"?>
+<p:sld xmlns:a="http://schemas.openxmlformats.org/drawingml/2006/main" xmlns:r="http://schemas.openxmlformats.org/officeDocument/2006/relationships" xmlns:p="http://schemas.openxmlformats.org/presentationml/2006/main">
+  <p:cSld>
+    <p:spTree>
+      <p:nvGrpSpPr>
+        <p:cNvPr id="1" name=""/>
+        <p:cNvGrpSpPr/>
+        <p:nvPr/>
+      </p:nvGrpSpPr>
+      <p:grpSpPr>
+        <a:xfrm>
+          <a:off x="0" y="0"/>
+          <a:ext cx="0" cy="0"/>
+          <a:chOff x="0" y="0"/>
+          <a:chExt cx="0" cy="0"/>
+        </a:xfrm>
+      </p:grpSpPr>
+      <p:pic>
+        <p:nvPicPr>
+          <p:cNvPr id="4" name="Picture 3">
+            <a:extLst>
+              <a:ext uri="{FF2B5EF4-FFF2-40B4-BE49-F238E27FC236}">
+                <a16:creationId xmlns:a16="http://schemas.microsoft.com/office/drawing/2014/main" id="{141DFA2F-7F5F-4FAA-4CEB-79AC495BF2FD}"/>
+              </a:ext>
+            </a:extLst>
+          </p:cNvPr>
+          <p:cNvPicPr>
+            <a:picLocks noChangeAspect="1"/>
+          </p:cNvPicPr>
+          <p:nvPr/>
+        </p:nvPicPr>
+        <p:blipFill>
+          <a:blip r:embed="rId2"/>
+          <a:stretch>
+            <a:fillRect/>
+          </a:stretch>
+        </p:blipFill>
+        <p:spPr>
+          <a:xfrm>
+            <a:off x="2209800" y="890049"/>
+            <a:ext cx="7772400" cy="5077901"/>
+          </a:xfrm>
+          <a:prstGeom prst="rect">
+            <a:avLst/>
+          </a:prstGeom>
+        </p:spPr>
+      </p:pic>
+    </p:spTree>
+    <p:extLst>
+      <p:ext uri="{BB962C8B-B14F-4D97-AF65-F5344CB8AC3E}">
+        <p14:creationId xmlns:p14="http://schemas.microsoft.com/office/powerpoint/2010/main" val="180910735"/>
+      </p:ext>
+    </p:extLst>
+  </p:cSld>
+  <p:clrMapOvr>
+    <a:masterClrMapping/>
+  </p:clrMapOvr>
+</p:sld>
+</file>
+
+<file path=ppt/slides/slide4.xml><?xml version="1.0" encoding="utf-8"?>
+<p:sld xmlns:a="http://schemas.openxmlformats.org/drawingml/2006/main" xmlns:r="http://schemas.openxmlformats.org/officeDocument/2006/relationships" xmlns:p="http://schemas.openxmlformats.org/presentationml/2006/main">
+  <p:cSld>
+    <p:spTree>
+      <p:nvGrpSpPr>
+        <p:cNvPr id="1" name=""/>
+        <p:cNvGrpSpPr/>
+        <p:nvPr/>
+      </p:nvGrpSpPr>
+      <p:grpSpPr>
+        <a:xfrm>
+          <a:off x="0" y="0"/>
+          <a:ext cx="0" cy="0"/>
+          <a:chOff x="0" y="0"/>
+          <a:chExt cx="0" cy="0"/>
+        </a:xfrm>
+      </p:grpSpPr>
+      <p:pic>
+        <p:nvPicPr>
+          <p:cNvPr id="4" name="Picture 3">
+            <a:extLst>
+              <a:ext uri="{FF2B5EF4-FFF2-40B4-BE49-F238E27FC236}">
+                <a16:creationId xmlns:a16="http://schemas.microsoft.com/office/drawing/2014/main" id="{CA247642-E577-3BA0-8B0A-F2225DB21D1F}"/>
+              </a:ext>
+            </a:extLst>
+          </p:cNvPr>
+          <p:cNvPicPr>
+            <a:picLocks noChangeAspect="1"/>
+          </p:cNvPicPr>
+          <p:nvPr/>
+        </p:nvPicPr>
+        <p:blipFill>
+          <a:blip r:embed="rId2"/>
+          <a:stretch>
+            <a:fillRect/>
+          </a:stretch>
+        </p:blipFill>
+        <p:spPr>
+          <a:xfrm>
+            <a:off x="2449506" y="0"/>
+            <a:ext cx="7292988" cy="6858000"/>
+          </a:xfrm>
+          <a:prstGeom prst="rect">
+            <a:avLst/>
+          </a:prstGeom>
+        </p:spPr>
+      </p:pic>
+    </p:spTree>
+    <p:extLst>
+      <p:ext uri="{BB962C8B-B14F-4D97-AF65-F5344CB8AC3E}">
+        <p14:creationId xmlns:p14="http://schemas.microsoft.com/office/powerpoint/2010/main" val="2488698062"/>
+      </p:ext>
+    </p:extLst>
+  </p:cSld>
+  <p:clrMapOvr>
+    <a:masterClrMapping/>
+  </p:clrMapOvr>
+</p:sld>
+</file>
+
+<file path=ppt/slides/slide5.xml><?xml version="1.0" encoding="utf-8"?>
+<p:sld xmlns:a="http://schemas.openxmlformats.org/drawingml/2006/main" xmlns:r="http://schemas.openxmlformats.org/officeDocument/2006/relationships" xmlns:p="http://schemas.openxmlformats.org/presentationml/2006/main">
+  <p:cSld>
+    <p:spTree>
+      <p:nvGrpSpPr>
+        <p:cNvPr id="1" name=""/>
+        <p:cNvGrpSpPr/>
+        <p:nvPr/>
+      </p:nvGrpSpPr>
+      <p:grpSpPr>
+        <a:xfrm>
+          <a:off x="0" y="0"/>
+          <a:ext cx="0" cy="0"/>
+          <a:chOff x="0" y="0"/>
+          <a:chExt cx="0" cy="0"/>
+        </a:xfrm>
+      </p:grpSpPr>
+      <p:pic>
+        <p:nvPicPr>
+          <p:cNvPr id="5" name="Picture 4">
+            <a:extLst>
+              <a:ext uri="{FF2B5EF4-FFF2-40B4-BE49-F238E27FC236}">
+                <a16:creationId xmlns:a16="http://schemas.microsoft.com/office/drawing/2014/main" id="{105922C5-6110-DE1C-9E30-E96BEC50BB05}"/>
+              </a:ext>
+            </a:extLst>
+          </p:cNvPr>
+          <p:cNvPicPr>
+            <a:picLocks noChangeAspect="1"/>
+          </p:cNvPicPr>
+          <p:nvPr/>
+        </p:nvPicPr>
+        <p:blipFill>
+          <a:blip r:embed="rId2"/>
+          <a:stretch>
+            <a:fillRect/>
+          </a:stretch>
+        </p:blipFill>
+        <p:spPr>
+          <a:xfrm>
+            <a:off x="2209800" y="334364"/>
+            <a:ext cx="7772400" cy="6189272"/>
+          </a:xfrm>
+          <a:prstGeom prst="rect">
+            <a:avLst/>
+          </a:prstGeom>
+        </p:spPr>
+      </p:pic>
+    </p:spTree>
+    <p:extLst>
+      <p:ext uri="{BB962C8B-B14F-4D97-AF65-F5344CB8AC3E}">
+        <p14:creationId xmlns:p14="http://schemas.microsoft.com/office/powerpoint/2010/main" val="4172990515"/>
+      </p:ext>
+    </p:extLst>
+  </p:cSld>
+  <p:clrMapOvr>
+    <a:masterClrMapping/>
+  </p:clrMapOvr>
+</p:sld>
+</file>
+
+<file path=ppt/slides/slide6.xml><?xml version="1.0" encoding="utf-8"?>
+<p:sld xmlns:a="http://schemas.openxmlformats.org/drawingml/2006/main" xmlns:r="http://schemas.openxmlformats.org/officeDocument/2006/relationships" xmlns:p="http://schemas.openxmlformats.org/presentationml/2006/main">
+  <p:cSld>
+    <p:spTree>
+      <p:nvGrpSpPr>
+        <p:cNvPr id="1" name=""/>
+        <p:cNvGrpSpPr/>
+        <p:nvPr/>
+      </p:nvGrpSpPr>
+      <p:grpSpPr>
+        <a:xfrm>
+          <a:off x="0" y="0"/>
+          <a:ext cx="0" cy="0"/>
+          <a:chOff x="0" y="0"/>
+          <a:chExt cx="0" cy="0"/>
+        </a:xfrm>
+      </p:grpSpPr>
+      <p:pic>
+        <p:nvPicPr>
+          <p:cNvPr id="4" name="Picture 3">
+            <a:extLst>
+              <a:ext uri="{FF2B5EF4-FFF2-40B4-BE49-F238E27FC236}">
+                <a16:creationId xmlns:a16="http://schemas.microsoft.com/office/drawing/2014/main" id="{96533F43-EBAC-5136-8646-FFAAD853EF3F}"/>
+              </a:ext>
+            </a:extLst>
+          </p:cNvPr>
+          <p:cNvPicPr>
+            <a:picLocks noChangeAspect="1"/>
+          </p:cNvPicPr>
+          <p:nvPr/>
+        </p:nvPicPr>
+        <p:blipFill>
+          <a:blip r:embed="rId2"/>
+          <a:stretch>
+            <a:fillRect/>
+          </a:stretch>
+        </p:blipFill>
+        <p:spPr>
+          <a:xfrm>
+            <a:off x="2209800" y="741607"/>
+            <a:ext cx="7772400" cy="5374785"/>
+          </a:xfrm>
+          <a:prstGeom prst="rect">
+            <a:avLst/>
+          </a:prstGeom>
+        </p:spPr>
+      </p:pic>
+    </p:spTree>
+    <p:extLst>
+      <p:ext uri="{BB962C8B-B14F-4D97-AF65-F5344CB8AC3E}">
+        <p14:creationId xmlns:p14="http://schemas.microsoft.com/office/powerpoint/2010/main" val="3165265149"/>
+      </p:ext>
+    </p:extLst>
+  </p:cSld>
+  <p:clrMapOvr>
+    <a:masterClrMapping/>
+  </p:clrMapOvr>
+</p:sld>
+</file>
+
+<file path=ppt/slides/slide7.xml><?xml version="1.0" encoding="utf-8"?>
+<p:sld xmlns:a="http://schemas.openxmlformats.org/drawingml/2006/main" xmlns:r="http://schemas.openxmlformats.org/officeDocument/2006/relationships" xmlns:p="http://schemas.openxmlformats.org/presentationml/2006/main">
+  <p:cSld>
+    <p:spTree>
+      <p:nvGrpSpPr>
+        <p:cNvPr id="1" name=""/>
+        <p:cNvGrpSpPr/>
+        <p:nvPr/>
+      </p:nvGrpSpPr>
+      <p:grpSpPr>
+        <a:xfrm>
+          <a:off x="0" y="0"/>
+          <a:ext cx="0" cy="0"/>
+          <a:chOff x="0" y="0"/>
+          <a:chExt cx="0" cy="0"/>
+        </a:xfrm>
+      </p:grpSpPr>
+      <p:pic>
+        <p:nvPicPr>
+          <p:cNvPr id="4" name="Picture 3">
+            <a:extLst>
+              <a:ext uri="{FF2B5EF4-FFF2-40B4-BE49-F238E27FC236}">
+                <a16:creationId xmlns:a16="http://schemas.microsoft.com/office/drawing/2014/main" id="{95618535-EEE2-DA05-A613-345C22A1D0BF}"/>
+              </a:ext>
+            </a:extLst>
+          </p:cNvPr>
+          <p:cNvPicPr>
+            <a:picLocks noChangeAspect="1"/>
+          </p:cNvPicPr>
+          <p:nvPr/>
+        </p:nvPicPr>
+        <p:blipFill>
+          <a:blip r:embed="rId2"/>
+          <a:stretch>
+            <a:fillRect/>
+          </a:stretch>
+        </p:blipFill>
+        <p:spPr>
+          <a:xfrm>
+            <a:off x="2209800" y="343826"/>
+            <a:ext cx="7772400" cy="6170348"/>
+          </a:xfrm>
+          <a:prstGeom prst="rect">
+            <a:avLst/>
+          </a:prstGeom>
+        </p:spPr>
+      </p:pic>
+    </p:spTree>
+    <p:extLst>
+      <p:ext uri="{BB962C8B-B14F-4D97-AF65-F5344CB8AC3E}">
+        <p14:creationId xmlns:p14="http://schemas.microsoft.com/office/powerpoint/2010/main" val="4087913219"/>
+      </p:ext>
+    </p:extLst>
+  </p:cSld>
+  <p:clrMapOvr>
+    <a:masterClrMapping/>
+  </p:clrMapOvr>
+</p:sld>
+</file>
+
+<file path=ppt/slides/slide8.xml><?xml version="1.0" encoding="utf-8"?>
+<p:sld xmlns:a="http://schemas.openxmlformats.org/drawingml/2006/main" xmlns:r="http://schemas.openxmlformats.org/officeDocument/2006/relationships" xmlns:p="http://schemas.openxmlformats.org/presentationml/2006/main">
+  <p:cSld>
+    <p:spTree>
+      <p:nvGrpSpPr>
+        <p:cNvPr id="1" name=""/>
+        <p:cNvGrpSpPr/>
+        <p:nvPr/>
+      </p:nvGrpSpPr>
+      <p:grpSpPr>
+        <a:xfrm>
+          <a:off x="0" y="0"/>
+          <a:ext cx="0" cy="0"/>
+          <a:chOff x="0" y="0"/>
+          <a:chExt cx="0" cy="0"/>
+        </a:xfrm>
+      </p:grpSpPr>
+      <p:pic>
+        <p:nvPicPr>
+          <p:cNvPr id="6" name="Picture 5">
+            <a:extLst>
+              <a:ext uri="{FF2B5EF4-FFF2-40B4-BE49-F238E27FC236}">
+                <a16:creationId xmlns:a16="http://schemas.microsoft.com/office/drawing/2014/main" id="{7B621DA9-CDF4-DE06-4F31-D3C91B4CE1C1}"/>
+              </a:ext>
+            </a:extLst>
+          </p:cNvPr>
+          <p:cNvPicPr>
+            <a:picLocks noChangeAspect="1"/>
+          </p:cNvPicPr>
+          <p:nvPr/>
+        </p:nvPicPr>
+        <p:blipFill>
+          <a:blip r:embed="rId2"/>
+          <a:stretch>
+            <a:fillRect/>
+          </a:stretch>
+        </p:blipFill>
+        <p:spPr>
+          <a:xfrm>
+            <a:off x="2209800" y="1247827"/>
+            <a:ext cx="7772400" cy="4362346"/>
+          </a:xfrm>
+          <a:prstGeom prst="rect">
+            <a:avLst/>
+          </a:prstGeom>
+        </p:spPr>
+      </p:pic>
+    </p:spTree>
+    <p:extLst>
+      <p:ext uri="{BB962C8B-B14F-4D97-AF65-F5344CB8AC3E}">
+        <p14:creationId xmlns:p14="http://schemas.microsoft.com/office/powerpoint/2010/main" val="3370404782"/>
+      </p:ext>
+    </p:extLst>
+  </p:cSld>
+  <p:clrMapOvr>
+    <a:masterClrMapping/>
+  </p:clrMapOvr>
+</p:sld>
+</file>
+
+<file path=ppt/slides/slide9.xml><?xml version="1.0" encoding="utf-8"?>
+<p:sld xmlns:a="http://schemas.openxmlformats.org/drawingml/2006/main" xmlns:r="http://schemas.openxmlformats.org/officeDocument/2006/relationships" xmlns:p="http://schemas.openxmlformats.org/presentationml/2006/main">
+  <p:cSld>
+    <p:spTree>
+      <p:nvGrpSpPr>
+        <p:cNvPr id="1" name=""/>
+        <p:cNvGrpSpPr/>
+        <p:nvPr/>
+      </p:nvGrpSpPr>
+      <p:grpSpPr>
+        <a:xfrm>
+          <a:off x="0" y="0"/>
+          <a:ext cx="0" cy="0"/>
+          <a:chOff x="0" y="0"/>
+          <a:chExt cx="0" cy="0"/>
+        </a:xfrm>
+      </p:grpSpPr>
+      <p:pic>
+        <p:nvPicPr>
+          <p:cNvPr id="3074" name="Picture 2">
+            <a:extLst>
+              <a:ext uri="{FF2B5EF4-FFF2-40B4-BE49-F238E27FC236}">
+                <a16:creationId xmlns:a16="http://schemas.microsoft.com/office/drawing/2014/main" id="{C88496A2-2F11-AF42-EE31-B8583C777A7D}"/>
+              </a:ext>
+            </a:extLst>
+          </p:cNvPr>
+          <p:cNvPicPr>
+            <a:picLocks noChangeAspect="1" noChangeArrowheads="1"/>
+          </p:cNvPicPr>
+          <p:nvPr/>
+        </p:nvPicPr>
+        <p:blipFill>
+          <a:blip r:embed="rId2">
+            <a:extLst>
+              <a:ext uri="{28A0092B-C50C-407E-A947-70E740481C1C}">
+                <a14:useLocalDpi xmlns:a14="http://schemas.microsoft.com/office/drawing/2010/main" val="0"/>
+              </a:ext>
+            </a:extLst>
+          </a:blip>
+          <a:srcRect/>
+          <a:stretch>
+            <a:fillRect/>
+          </a:stretch>
+        </p:blipFill>
+        <p:spPr bwMode="auto">
+          <a:xfrm>
+            <a:off x="0" y="874713"/>
+            <a:ext cx="12192000" cy="5108575"/>
+          </a:xfrm>
+          <a:prstGeom prst="rect">
+            <a:avLst/>
+          </a:prstGeom>
+          <a:noFill/>
+          <a:extLst>
+            <a:ext uri="{909E8E84-426E-40DD-AFC4-6F175D3DCCD1}">
+              <a14:hiddenFill xmlns:a14="http://schemas.microsoft.com/office/drawing/2010/main">
+                <a:solidFill>
+                  <a:srgbClr val="FFFFFF"/>
+                </a:solidFill>
+              </a14:hiddenFill>
+            </a:ext>
+          </a:extLst>
+        </p:spPr>
+      </p:pic>
+    </p:spTree>
+    <p:extLst>
+      <p:ext uri="{BB962C8B-B14F-4D97-AF65-F5344CB8AC3E}">
+        <p14:creationId xmlns:p14="http://schemas.microsoft.com/office/powerpoint/2010/main" val="48002481"/>
       </p:ext>
     </p:extLst>
   </p:cSld>

</xml_diff>